<commit_message>
UPDATE: individual yaml files
</commit_message>
<xml_diff>
--- a/assets/facility-icons/icons.pptx
+++ b/assets/facility-icons/icons.pptx
@@ -270,7 +270,7 @@
           <a:p>
             <a:fld id="{11D5A04A-CF49-1842-BD70-375BE74049A1}" type="datetimeFigureOut">
               <a:rPr lang="en-GB" smtClean="0"/>
-              <a:t>05/12/2022</a:t>
+              <a:t>08/12/2022</a:t>
             </a:fld>
             <a:endParaRPr lang="en-GB"/>
           </a:p>
@@ -468,7 +468,7 @@
           <a:p>
             <a:fld id="{11D5A04A-CF49-1842-BD70-375BE74049A1}" type="datetimeFigureOut">
               <a:rPr lang="en-GB" smtClean="0"/>
-              <a:t>05/12/2022</a:t>
+              <a:t>08/12/2022</a:t>
             </a:fld>
             <a:endParaRPr lang="en-GB"/>
           </a:p>
@@ -676,7 +676,7 @@
           <a:p>
             <a:fld id="{11D5A04A-CF49-1842-BD70-375BE74049A1}" type="datetimeFigureOut">
               <a:rPr lang="en-GB" smtClean="0"/>
-              <a:t>05/12/2022</a:t>
+              <a:t>08/12/2022</a:t>
             </a:fld>
             <a:endParaRPr lang="en-GB"/>
           </a:p>
@@ -874,7 +874,7 @@
           <a:p>
             <a:fld id="{11D5A04A-CF49-1842-BD70-375BE74049A1}" type="datetimeFigureOut">
               <a:rPr lang="en-GB" smtClean="0"/>
-              <a:t>05/12/2022</a:t>
+              <a:t>08/12/2022</a:t>
             </a:fld>
             <a:endParaRPr lang="en-GB"/>
           </a:p>
@@ -1149,7 +1149,7 @@
           <a:p>
             <a:fld id="{11D5A04A-CF49-1842-BD70-375BE74049A1}" type="datetimeFigureOut">
               <a:rPr lang="en-GB" smtClean="0"/>
-              <a:t>05/12/2022</a:t>
+              <a:t>08/12/2022</a:t>
             </a:fld>
             <a:endParaRPr lang="en-GB"/>
           </a:p>
@@ -1414,7 +1414,7 @@
           <a:p>
             <a:fld id="{11D5A04A-CF49-1842-BD70-375BE74049A1}" type="datetimeFigureOut">
               <a:rPr lang="en-GB" smtClean="0"/>
-              <a:t>05/12/2022</a:t>
+              <a:t>08/12/2022</a:t>
             </a:fld>
             <a:endParaRPr lang="en-GB"/>
           </a:p>
@@ -1826,7 +1826,7 @@
           <a:p>
             <a:fld id="{11D5A04A-CF49-1842-BD70-375BE74049A1}" type="datetimeFigureOut">
               <a:rPr lang="en-GB" smtClean="0"/>
-              <a:t>05/12/2022</a:t>
+              <a:t>08/12/2022</a:t>
             </a:fld>
             <a:endParaRPr lang="en-GB"/>
           </a:p>
@@ -1967,7 +1967,7 @@
           <a:p>
             <a:fld id="{11D5A04A-CF49-1842-BD70-375BE74049A1}" type="datetimeFigureOut">
               <a:rPr lang="en-GB" smtClean="0"/>
-              <a:t>05/12/2022</a:t>
+              <a:t>08/12/2022</a:t>
             </a:fld>
             <a:endParaRPr lang="en-GB"/>
           </a:p>
@@ -2080,7 +2080,7 @@
           <a:p>
             <a:fld id="{11D5A04A-CF49-1842-BD70-375BE74049A1}" type="datetimeFigureOut">
               <a:rPr lang="en-GB" smtClean="0"/>
-              <a:t>05/12/2022</a:t>
+              <a:t>08/12/2022</a:t>
             </a:fld>
             <a:endParaRPr lang="en-GB"/>
           </a:p>
@@ -2391,7 +2391,7 @@
           <a:p>
             <a:fld id="{11D5A04A-CF49-1842-BD70-375BE74049A1}" type="datetimeFigureOut">
               <a:rPr lang="en-GB" smtClean="0"/>
-              <a:t>05/12/2022</a:t>
+              <a:t>08/12/2022</a:t>
             </a:fld>
             <a:endParaRPr lang="en-GB"/>
           </a:p>
@@ -2679,7 +2679,7 @@
           <a:p>
             <a:fld id="{11D5A04A-CF49-1842-BD70-375BE74049A1}" type="datetimeFigureOut">
               <a:rPr lang="en-GB" smtClean="0"/>
-              <a:t>05/12/2022</a:t>
+              <a:t>08/12/2022</a:t>
             </a:fld>
             <a:endParaRPr lang="en-GB"/>
           </a:p>
@@ -2920,7 +2920,7 @@
           <a:p>
             <a:fld id="{11D5A04A-CF49-1842-BD70-375BE74049A1}" type="datetimeFigureOut">
               <a:rPr lang="en-GB" smtClean="0"/>
-              <a:t>05/12/2022</a:t>
+              <a:t>08/12/2022</a:t>
             </a:fld>
             <a:endParaRPr lang="en-GB"/>
           </a:p>
@@ -7239,6 +7239,316 @@
           </a:prstGeom>
         </p:spPr>
       </p:pic>
+      <p:sp>
+        <p:nvSpPr>
+          <p:cNvPr id="4" name="Graphic 4" descr="Marker with solid fill">
+            <a:extLst>
+              <a:ext uri="{FF2B5EF4-FFF2-40B4-BE49-F238E27FC236}">
+                <a16:creationId xmlns:a16="http://schemas.microsoft.com/office/drawing/2014/main" id="{742D270A-C323-BF47-50EF-A56E688A9077}"/>
+              </a:ext>
+            </a:extLst>
+          </p:cNvPr>
+          <p:cNvSpPr/>
+          <p:nvPr/>
+        </p:nvSpPr>
+        <p:spPr>
+          <a:xfrm>
+            <a:off x="5782027" y="621416"/>
+            <a:ext cx="627945" cy="1020000"/>
+          </a:xfrm>
+          <a:custGeom>
+            <a:avLst/>
+            <a:gdLst>
+              <a:gd name="connsiteX0" fmla="*/ 313973 w 627945"/>
+              <a:gd name="connsiteY0" fmla="*/ 450000 h 1020000"/>
+              <a:gd name="connsiteX1" fmla="*/ 178973 w 627945"/>
+              <a:gd name="connsiteY1" fmla="*/ 315000 h 1020000"/>
+              <a:gd name="connsiteX2" fmla="*/ 313973 w 627945"/>
+              <a:gd name="connsiteY2" fmla="*/ 180000 h 1020000"/>
+              <a:gd name="connsiteX3" fmla="*/ 448973 w 627945"/>
+              <a:gd name="connsiteY3" fmla="*/ 315000 h 1020000"/>
+              <a:gd name="connsiteX4" fmla="*/ 313973 w 627945"/>
+              <a:gd name="connsiteY4" fmla="*/ 450000 h 1020000"/>
+              <a:gd name="connsiteX5" fmla="*/ 313973 w 627945"/>
+              <a:gd name="connsiteY5" fmla="*/ 0 h 1020000"/>
+              <a:gd name="connsiteX6" fmla="*/ 54473 w 627945"/>
+              <a:gd name="connsiteY6" fmla="*/ 138000 h 1020000"/>
+              <a:gd name="connsiteX7" fmla="*/ 21473 w 627945"/>
+              <a:gd name="connsiteY7" fmla="*/ 430500 h 1020000"/>
+              <a:gd name="connsiteX8" fmla="*/ 163973 w 627945"/>
+              <a:gd name="connsiteY8" fmla="*/ 745500 h 1020000"/>
+              <a:gd name="connsiteX9" fmla="*/ 286973 w 627945"/>
+              <a:gd name="connsiteY9" fmla="*/ 1003500 h 1020000"/>
+              <a:gd name="connsiteX10" fmla="*/ 313973 w 627945"/>
+              <a:gd name="connsiteY10" fmla="*/ 1020000 h 1020000"/>
+              <a:gd name="connsiteX11" fmla="*/ 340973 w 627945"/>
+              <a:gd name="connsiteY11" fmla="*/ 1003500 h 1020000"/>
+              <a:gd name="connsiteX12" fmla="*/ 463973 w 627945"/>
+              <a:gd name="connsiteY12" fmla="*/ 745500 h 1020000"/>
+              <a:gd name="connsiteX13" fmla="*/ 606473 w 627945"/>
+              <a:gd name="connsiteY13" fmla="*/ 430500 h 1020000"/>
+              <a:gd name="connsiteX14" fmla="*/ 573473 w 627945"/>
+              <a:gd name="connsiteY14" fmla="*/ 138000 h 1020000"/>
+              <a:gd name="connsiteX15" fmla="*/ 313973 w 627945"/>
+              <a:gd name="connsiteY15" fmla="*/ 0 h 1020000"/>
+              <a:gd name="connsiteX0" fmla="*/ 313973 w 627945"/>
+              <a:gd name="connsiteY0" fmla="*/ 450000 h 1020000"/>
+              <a:gd name="connsiteX1" fmla="*/ 178973 w 627945"/>
+              <a:gd name="connsiteY1" fmla="*/ 315000 h 1020000"/>
+              <a:gd name="connsiteX2" fmla="*/ 313973 w 627945"/>
+              <a:gd name="connsiteY2" fmla="*/ 180000 h 1020000"/>
+              <a:gd name="connsiteX3" fmla="*/ 313973 w 627945"/>
+              <a:gd name="connsiteY3" fmla="*/ 450000 h 1020000"/>
+              <a:gd name="connsiteX4" fmla="*/ 313973 w 627945"/>
+              <a:gd name="connsiteY4" fmla="*/ 0 h 1020000"/>
+              <a:gd name="connsiteX5" fmla="*/ 54473 w 627945"/>
+              <a:gd name="connsiteY5" fmla="*/ 138000 h 1020000"/>
+              <a:gd name="connsiteX6" fmla="*/ 21473 w 627945"/>
+              <a:gd name="connsiteY6" fmla="*/ 430500 h 1020000"/>
+              <a:gd name="connsiteX7" fmla="*/ 163973 w 627945"/>
+              <a:gd name="connsiteY7" fmla="*/ 745500 h 1020000"/>
+              <a:gd name="connsiteX8" fmla="*/ 286973 w 627945"/>
+              <a:gd name="connsiteY8" fmla="*/ 1003500 h 1020000"/>
+              <a:gd name="connsiteX9" fmla="*/ 313973 w 627945"/>
+              <a:gd name="connsiteY9" fmla="*/ 1020000 h 1020000"/>
+              <a:gd name="connsiteX10" fmla="*/ 340973 w 627945"/>
+              <a:gd name="connsiteY10" fmla="*/ 1003500 h 1020000"/>
+              <a:gd name="connsiteX11" fmla="*/ 463973 w 627945"/>
+              <a:gd name="connsiteY11" fmla="*/ 745500 h 1020000"/>
+              <a:gd name="connsiteX12" fmla="*/ 606473 w 627945"/>
+              <a:gd name="connsiteY12" fmla="*/ 430500 h 1020000"/>
+              <a:gd name="connsiteX13" fmla="*/ 573473 w 627945"/>
+              <a:gd name="connsiteY13" fmla="*/ 138000 h 1020000"/>
+              <a:gd name="connsiteX14" fmla="*/ 313973 w 627945"/>
+              <a:gd name="connsiteY14" fmla="*/ 0 h 1020000"/>
+              <a:gd name="connsiteX0" fmla="*/ 313973 w 627945"/>
+              <a:gd name="connsiteY0" fmla="*/ 180000 h 1020000"/>
+              <a:gd name="connsiteX1" fmla="*/ 178973 w 627945"/>
+              <a:gd name="connsiteY1" fmla="*/ 315000 h 1020000"/>
+              <a:gd name="connsiteX2" fmla="*/ 313973 w 627945"/>
+              <a:gd name="connsiteY2" fmla="*/ 180000 h 1020000"/>
+              <a:gd name="connsiteX3" fmla="*/ 313973 w 627945"/>
+              <a:gd name="connsiteY3" fmla="*/ 0 h 1020000"/>
+              <a:gd name="connsiteX4" fmla="*/ 54473 w 627945"/>
+              <a:gd name="connsiteY4" fmla="*/ 138000 h 1020000"/>
+              <a:gd name="connsiteX5" fmla="*/ 21473 w 627945"/>
+              <a:gd name="connsiteY5" fmla="*/ 430500 h 1020000"/>
+              <a:gd name="connsiteX6" fmla="*/ 163973 w 627945"/>
+              <a:gd name="connsiteY6" fmla="*/ 745500 h 1020000"/>
+              <a:gd name="connsiteX7" fmla="*/ 286973 w 627945"/>
+              <a:gd name="connsiteY7" fmla="*/ 1003500 h 1020000"/>
+              <a:gd name="connsiteX8" fmla="*/ 313973 w 627945"/>
+              <a:gd name="connsiteY8" fmla="*/ 1020000 h 1020000"/>
+              <a:gd name="connsiteX9" fmla="*/ 340973 w 627945"/>
+              <a:gd name="connsiteY9" fmla="*/ 1003500 h 1020000"/>
+              <a:gd name="connsiteX10" fmla="*/ 463973 w 627945"/>
+              <a:gd name="connsiteY10" fmla="*/ 745500 h 1020000"/>
+              <a:gd name="connsiteX11" fmla="*/ 606473 w 627945"/>
+              <a:gd name="connsiteY11" fmla="*/ 430500 h 1020000"/>
+              <a:gd name="connsiteX12" fmla="*/ 573473 w 627945"/>
+              <a:gd name="connsiteY12" fmla="*/ 138000 h 1020000"/>
+              <a:gd name="connsiteX13" fmla="*/ 313973 w 627945"/>
+              <a:gd name="connsiteY13" fmla="*/ 0 h 1020000"/>
+              <a:gd name="connsiteX0" fmla="*/ 313973 w 627945"/>
+              <a:gd name="connsiteY0" fmla="*/ 0 h 1020000"/>
+              <a:gd name="connsiteX1" fmla="*/ 54473 w 627945"/>
+              <a:gd name="connsiteY1" fmla="*/ 138000 h 1020000"/>
+              <a:gd name="connsiteX2" fmla="*/ 21473 w 627945"/>
+              <a:gd name="connsiteY2" fmla="*/ 430500 h 1020000"/>
+              <a:gd name="connsiteX3" fmla="*/ 163973 w 627945"/>
+              <a:gd name="connsiteY3" fmla="*/ 745500 h 1020000"/>
+              <a:gd name="connsiteX4" fmla="*/ 286973 w 627945"/>
+              <a:gd name="connsiteY4" fmla="*/ 1003500 h 1020000"/>
+              <a:gd name="connsiteX5" fmla="*/ 313973 w 627945"/>
+              <a:gd name="connsiteY5" fmla="*/ 1020000 h 1020000"/>
+              <a:gd name="connsiteX6" fmla="*/ 340973 w 627945"/>
+              <a:gd name="connsiteY6" fmla="*/ 1003500 h 1020000"/>
+              <a:gd name="connsiteX7" fmla="*/ 463973 w 627945"/>
+              <a:gd name="connsiteY7" fmla="*/ 745500 h 1020000"/>
+              <a:gd name="connsiteX8" fmla="*/ 606473 w 627945"/>
+              <a:gd name="connsiteY8" fmla="*/ 430500 h 1020000"/>
+              <a:gd name="connsiteX9" fmla="*/ 573473 w 627945"/>
+              <a:gd name="connsiteY9" fmla="*/ 138000 h 1020000"/>
+              <a:gd name="connsiteX10" fmla="*/ 313973 w 627945"/>
+              <a:gd name="connsiteY10" fmla="*/ 0 h 1020000"/>
+            </a:gdLst>
+            <a:ahLst/>
+            <a:cxnLst>
+              <a:cxn ang="0">
+                <a:pos x="connsiteX0" y="connsiteY0"/>
+              </a:cxn>
+              <a:cxn ang="0">
+                <a:pos x="connsiteX1" y="connsiteY1"/>
+              </a:cxn>
+              <a:cxn ang="0">
+                <a:pos x="connsiteX2" y="connsiteY2"/>
+              </a:cxn>
+              <a:cxn ang="0">
+                <a:pos x="connsiteX3" y="connsiteY3"/>
+              </a:cxn>
+              <a:cxn ang="0">
+                <a:pos x="connsiteX4" y="connsiteY4"/>
+              </a:cxn>
+              <a:cxn ang="0">
+                <a:pos x="connsiteX5" y="connsiteY5"/>
+              </a:cxn>
+              <a:cxn ang="0">
+                <a:pos x="connsiteX6" y="connsiteY6"/>
+              </a:cxn>
+              <a:cxn ang="0">
+                <a:pos x="connsiteX7" y="connsiteY7"/>
+              </a:cxn>
+              <a:cxn ang="0">
+                <a:pos x="connsiteX8" y="connsiteY8"/>
+              </a:cxn>
+              <a:cxn ang="0">
+                <a:pos x="connsiteX9" y="connsiteY9"/>
+              </a:cxn>
+              <a:cxn ang="0">
+                <a:pos x="connsiteX10" y="connsiteY10"/>
+              </a:cxn>
+            </a:cxnLst>
+            <a:rect l="l" t="t" r="r" b="b"/>
+            <a:pathLst>
+              <a:path w="627945" h="1020000">
+                <a:moveTo>
+                  <a:pt x="313973" y="0"/>
+                </a:moveTo>
+                <a:cubicBezTo>
+                  <a:pt x="210473" y="0"/>
+                  <a:pt x="112973" y="51000"/>
+                  <a:pt x="54473" y="138000"/>
+                </a:cubicBezTo>
+                <a:cubicBezTo>
+                  <a:pt x="-4027" y="223500"/>
+                  <a:pt x="-16027" y="333000"/>
+                  <a:pt x="21473" y="430500"/>
+                </a:cubicBezTo>
+                <a:lnTo>
+                  <a:pt x="163973" y="745500"/>
+                </a:lnTo>
+                <a:lnTo>
+                  <a:pt x="286973" y="1003500"/>
+                </a:lnTo>
+                <a:cubicBezTo>
+                  <a:pt x="291473" y="1014000"/>
+                  <a:pt x="301973" y="1020000"/>
+                  <a:pt x="313973" y="1020000"/>
+                </a:cubicBezTo>
+                <a:cubicBezTo>
+                  <a:pt x="325973" y="1020000"/>
+                  <a:pt x="336473" y="1014000"/>
+                  <a:pt x="340973" y="1003500"/>
+                </a:cubicBezTo>
+                <a:lnTo>
+                  <a:pt x="463973" y="745500"/>
+                </a:lnTo>
+                <a:lnTo>
+                  <a:pt x="606473" y="430500"/>
+                </a:lnTo>
+                <a:cubicBezTo>
+                  <a:pt x="643973" y="333000"/>
+                  <a:pt x="631973" y="223500"/>
+                  <a:pt x="573473" y="138000"/>
+                </a:cubicBezTo>
+                <a:cubicBezTo>
+                  <a:pt x="514973" y="51000"/>
+                  <a:pt x="417473" y="0"/>
+                  <a:pt x="313973" y="0"/>
+                </a:cubicBezTo>
+                <a:close/>
+              </a:path>
+            </a:pathLst>
+          </a:custGeom>
+          <a:solidFill>
+            <a:srgbClr val="17A9AE"/>
+          </a:solidFill>
+          <a:ln w="14982" cap="flat">
+            <a:solidFill>
+              <a:schemeClr val="tx1"/>
+            </a:solidFill>
+            <a:prstDash val="solid"/>
+            <a:miter/>
+          </a:ln>
+        </p:spPr>
+        <p:txBody>
+          <a:bodyPr rtlCol="0" anchor="ctr"/>
+          <a:lstStyle/>
+          <a:p>
+            <a:endParaRPr lang="en-GB"/>
+          </a:p>
+        </p:txBody>
+      </p:sp>
+      <p:sp>
+        <p:nvSpPr>
+          <p:cNvPr id="5" name="TextBox 4">
+            <a:extLst>
+              <a:ext uri="{FF2B5EF4-FFF2-40B4-BE49-F238E27FC236}">
+                <a16:creationId xmlns:a16="http://schemas.microsoft.com/office/drawing/2014/main" id="{302DBE57-6137-B5CC-8F99-0C1D95386E01}"/>
+              </a:ext>
+            </a:extLst>
+          </p:cNvPr>
+          <p:cNvSpPr txBox="1"/>
+          <p:nvPr/>
+        </p:nvSpPr>
+        <p:spPr>
+          <a:xfrm>
+            <a:off x="6751993" y="906239"/>
+            <a:ext cx="1234890" cy="369332"/>
+          </a:xfrm>
+          <a:prstGeom prst="rect">
+            <a:avLst/>
+          </a:prstGeom>
+          <a:noFill/>
+        </p:spPr>
+        <p:txBody>
+          <a:bodyPr wrap="none" rtlCol="0">
+            <a:spAutoFit/>
+          </a:bodyPr>
+          <a:lstStyle/>
+          <a:p>
+            <a:r>
+              <a:rPr lang="en-GB" dirty="0"/>
+              <a:t>Data portal</a:t>
+            </a:r>
+          </a:p>
+        </p:txBody>
+      </p:sp>
+      <p:pic>
+        <p:nvPicPr>
+          <p:cNvPr id="17" name="Graphic 16" descr="Database with solid fill">
+            <a:extLst>
+              <a:ext uri="{FF2B5EF4-FFF2-40B4-BE49-F238E27FC236}">
+                <a16:creationId xmlns:a16="http://schemas.microsoft.com/office/drawing/2014/main" id="{28E591B9-ABBD-4AEB-7AD4-E2B5B573ADA4}"/>
+              </a:ext>
+            </a:extLst>
+          </p:cNvPr>
+          <p:cNvPicPr>
+            <a:picLocks noChangeAspect="1"/>
+          </p:cNvPicPr>
+          <p:nvPr/>
+        </p:nvPicPr>
+        <p:blipFill>
+          <a:blip r:embed="rId10">
+            <a:extLst>
+              <a:ext uri="{96DAC541-7B7A-43D3-8B79-37D633B846F1}">
+                <asvg:svgBlip xmlns:asvg="http://schemas.microsoft.com/office/drawing/2016/SVG/main" r:embed="rId11"/>
+              </a:ext>
+            </a:extLst>
+          </a:blip>
+          <a:srcRect/>
+          <a:stretch/>
+        </p:blipFill>
+        <p:spPr>
+          <a:xfrm>
+            <a:off x="5861772" y="742627"/>
+            <a:ext cx="459001" cy="459001"/>
+          </a:xfrm>
+          <a:prstGeom prst="rect">
+            <a:avLst/>
+          </a:prstGeom>
+        </p:spPr>
+      </p:pic>
     </p:spTree>
     <p:extLst>
       <p:ext uri="{BB962C8B-B14F-4D97-AF65-F5344CB8AC3E}">

</xml_diff>